<commit_message>
Modify PP and readme
</commit_message>
<xml_diff>
--- a/Step8/Step8-Azure Monitor.pptx
+++ b/Step8/Step8-Azure Monitor.pptx
@@ -7325,27 +7325,161 @@
       </p:grpSpPr>
       <p:sp>
         <p:nvSpPr>
-          <p:cNvPr id="2" name="Title 1"/>
-          <p:cNvSpPr>
-            <a:spLocks noGrp="1"/>
+          <p:cNvPr id="4" name="Title 1">
+            <a:extLst>
+              <a:ext uri="{FF2B5EF4-FFF2-40B4-BE49-F238E27FC236}">
+                <a16:creationId xmlns:a16="http://schemas.microsoft.com/office/drawing/2014/main" id="{64C128B4-69F4-4874-A340-8FEF9B84283D}"/>
+              </a:ext>
+            </a:extLst>
+          </p:cNvPr>
+          <p:cNvSpPr txBox="1">
+            <a:spLocks/>
           </p:cNvSpPr>
-          <p:nvPr>
-            <p:ph type="ctrTitle"/>
-          </p:nvPr>
+          <p:nvPr/>
         </p:nvSpPr>
         <p:spPr>
           <a:xfrm>
-            <a:off x="866856" y="889131"/>
-            <a:ext cx="10722224" cy="1195233"/>
+            <a:off x="350489" y="1391060"/>
+            <a:ext cx="11665802" cy="1136988"/>
           </a:xfrm>
+          <a:prstGeom prst="rect">
+            <a:avLst/>
+          </a:prstGeom>
         </p:spPr>
         <p:txBody>
-          <a:bodyPr/>
+          <a:bodyPr>
+            <a:noAutofit/>
+          </a:bodyPr>
+          <a:lstStyle>
+            <a:lvl1pPr algn="ctr" defTabSz="932372" rtl="0" eaLnBrk="1" latinLnBrk="0" hangingPunct="1">
+              <a:lnSpc>
+                <a:spcPct val="90000"/>
+              </a:lnSpc>
+              <a:spcBef>
+                <a:spcPct val="0"/>
+              </a:spcBef>
+              <a:buNone/>
+              <a:defRPr lang="en-US" sz="8159" b="0" kern="1200" cap="none" spc="-102" baseline="0">
+                <a:ln w="3175">
+                  <a:noFill/>
+                </a:ln>
+                <a:solidFill>
+                  <a:schemeClr val="bg1"/>
+                </a:solidFill>
+                <a:effectLst/>
+                <a:latin typeface="+mj-lt"/>
+                <a:ea typeface="+mn-ea"/>
+                <a:cs typeface="Segoe UI" pitchFamily="34" charset="0"/>
+              </a:defRPr>
+            </a:lvl1pPr>
+          </a:lstStyle>
+          <a:p>
+            <a:r>
+              <a:rPr lang="en-CA" sz="4400" dirty="0"/>
+              <a:t>Azure Monitor has 3 categories of monitoring data</a:t>
+            </a:r>
+          </a:p>
+        </p:txBody>
+      </p:sp>
+      <p:sp>
+        <p:nvSpPr>
+          <p:cNvPr id="5" name="Rectangle 4">
+            <a:extLst>
+              <a:ext uri="{FF2B5EF4-FFF2-40B4-BE49-F238E27FC236}">
+                <a16:creationId xmlns:a16="http://schemas.microsoft.com/office/drawing/2014/main" id="{72F87259-E385-4AB7-BF94-F75D82066318}"/>
+              </a:ext>
+            </a:extLst>
+          </p:cNvPr>
+          <p:cNvSpPr/>
+          <p:nvPr/>
+        </p:nvSpPr>
+        <p:spPr>
+          <a:xfrm>
+            <a:off x="649045" y="2386423"/>
+            <a:ext cx="11192466" cy="923330"/>
+          </a:xfrm>
+          <a:prstGeom prst="rect">
+            <a:avLst/>
+          </a:prstGeom>
+        </p:spPr>
+        <p:txBody>
+          <a:bodyPr>
+            <a:noAutofit/>
+          </a:bodyPr>
           <a:lstStyle/>
           <a:p>
+            <a:pPr marL="571500" indent="-571500" defTabSz="932372">
+              <a:lnSpc>
+                <a:spcPct val="90000"/>
+              </a:lnSpc>
+              <a:spcBef>
+                <a:spcPct val="0"/>
+              </a:spcBef>
+              <a:buFont typeface="Arial" panose="020B0604020202020204" pitchFamily="34" charset="0"/>
+              <a:buChar char="•"/>
+            </a:pPr>
             <a:r>
-              <a:rPr lang="en-US" b="1" dirty="0"/>
-              <a:t>Single resource view</a:t>
+              <a:rPr lang="en-CA" sz="4400" spc="-102" dirty="0">
+                <a:ln w="3175">
+                  <a:noFill/>
+                </a:ln>
+                <a:solidFill>
+                  <a:schemeClr val="bg1"/>
+                </a:solidFill>
+                <a:latin typeface="+mj-lt"/>
+                <a:cs typeface="Segoe UI" pitchFamily="34" charset="0"/>
+              </a:rPr>
+              <a:t>Activity logs</a:t>
+            </a:r>
+          </a:p>
+          <a:p>
+            <a:pPr marL="571500" indent="-571500" defTabSz="932372">
+              <a:lnSpc>
+                <a:spcPct val="90000"/>
+              </a:lnSpc>
+              <a:spcBef>
+                <a:spcPct val="0"/>
+              </a:spcBef>
+              <a:buFont typeface="Arial" panose="020B0604020202020204" pitchFamily="34" charset="0"/>
+              <a:buChar char="•"/>
+            </a:pPr>
+            <a:r>
+              <a:rPr lang="en-CA" sz="4400" spc="-102" dirty="0">
+                <a:ln w="3175">
+                  <a:noFill/>
+                </a:ln>
+                <a:solidFill>
+                  <a:schemeClr val="bg1"/>
+                </a:solidFill>
+                <a:latin typeface="+mj-lt"/>
+                <a:cs typeface="Segoe UI" pitchFamily="34" charset="0"/>
+              </a:rPr>
+              <a:t>Diagnostic logs</a:t>
+            </a:r>
+          </a:p>
+          <a:p>
+            <a:pPr marL="571500" indent="-571500" defTabSz="932372">
+              <a:lnSpc>
+                <a:spcPct val="90000"/>
+              </a:lnSpc>
+              <a:spcBef>
+                <a:spcPct val="0"/>
+              </a:spcBef>
+              <a:buFont typeface="Arial" panose="020B0604020202020204" pitchFamily="34" charset="0"/>
+              <a:buChar char="•"/>
+            </a:pPr>
+            <a:r>
+              <a:rPr lang="en-CA" sz="4400" spc="-102" dirty="0">
+                <a:ln w="3175">
+                  <a:noFill/>
+                </a:ln>
+                <a:solidFill>
+                  <a:schemeClr val="bg1"/>
+                </a:solidFill>
+                <a:latin typeface="+mj-lt"/>
+                <a:cs typeface="Segoe UI" pitchFamily="34" charset="0"/>
+              </a:rPr>
+              <a:t>Metrics</a:t>
             </a:r>
           </a:p>
         </p:txBody>

</xml_diff>